<commit_message>
update best practice module
</commit_message>
<xml_diff>
--- a/Best Practice.pptx
+++ b/Best Practice.pptx
@@ -264,7 +264,7 @@
           <a:p>
             <a:fld id="{758739C9-85FC-4C93-9741-8290C5EA7BF2}" type="datetimeFigureOut">
               <a:rPr lang="en-GB" smtClean="0"/>
-              <a:t>07/10/2021</a:t>
+              <a:t>03/02/2022</a:t>
             </a:fld>
             <a:endParaRPr lang="en-GB"/>
           </a:p>
@@ -442,7 +442,7 @@
           <a:p>
             <a:fld id="{F892DA15-DA85-B44D-A787-B2E63FF97AD5}" type="datetimeFigureOut">
               <a:rPr lang="it-IT" smtClean="0"/>
-              <a:t>07/10/2021</a:t>
+              <a:t>03/02/2022</a:t>
             </a:fld>
             <a:endParaRPr lang="it-IT"/>
           </a:p>
@@ -3901,7 +3901,7 @@
                   </a:prstClr>
                 </a:solidFill>
               </a:rPr>
-              <a:t>10/7/2021</a:t>
+              <a:t>2/3/2022</a:t>
             </a:fld>
             <a:endParaRPr lang="en-US" dirty="0">
               <a:solidFill>
@@ -4179,7 +4179,7 @@
                   </a:prstClr>
                 </a:solidFill>
               </a:rPr>
-              <a:t>10/7/2021</a:t>
+              <a:t>2/3/2022</a:t>
             </a:fld>
             <a:endParaRPr lang="en-US" dirty="0">
               <a:solidFill>
@@ -4520,7 +4520,7 @@
                   </a:prstClr>
                 </a:solidFill>
               </a:rPr>
-              <a:t>10/7/2021</a:t>
+              <a:t>2/3/2022</a:t>
             </a:fld>
             <a:endParaRPr lang="en-US" dirty="0">
               <a:solidFill>
@@ -4876,7 +4876,7 @@
                   </a:prstClr>
                 </a:solidFill>
               </a:rPr>
-              <a:t>10/7/2021</a:t>
+              <a:t>2/3/2022</a:t>
             </a:fld>
             <a:endParaRPr lang="en-US" dirty="0">
               <a:solidFill>
@@ -5217,7 +5217,7 @@
                   </a:prstClr>
                 </a:solidFill>
               </a:rPr>
-              <a:t>10/7/2021</a:t>
+              <a:t>2/3/2022</a:t>
             </a:fld>
             <a:endParaRPr lang="en-US" dirty="0">
               <a:solidFill>
@@ -5633,7 +5633,7 @@
                   </a:prstClr>
                 </a:solidFill>
               </a:rPr>
-              <a:t>10/7/2021</a:t>
+              <a:t>2/3/2022</a:t>
             </a:fld>
             <a:endParaRPr lang="en-US" dirty="0">
               <a:solidFill>
@@ -5830,7 +5830,7 @@
                   </a:prstClr>
                 </a:solidFill>
               </a:rPr>
-              <a:t>10/7/2021</a:t>
+              <a:t>2/3/2022</a:t>
             </a:fld>
             <a:endParaRPr lang="en-US" dirty="0">
               <a:solidFill>
@@ -6037,7 +6037,7 @@
                   </a:prstClr>
                 </a:solidFill>
               </a:rPr>
-              <a:t>10/7/2021</a:t>
+              <a:t>2/3/2022</a:t>
             </a:fld>
             <a:endParaRPr lang="en-US" dirty="0">
               <a:solidFill>
@@ -6234,7 +6234,7 @@
                   </a:prstClr>
                 </a:solidFill>
               </a:rPr>
-              <a:t>10/7/2021</a:t>
+              <a:t>2/3/2022</a:t>
             </a:fld>
             <a:endParaRPr lang="en-US" dirty="0">
               <a:solidFill>
@@ -6508,7 +6508,7 @@
                   </a:prstClr>
                 </a:solidFill>
               </a:rPr>
-              <a:t>10/7/2021</a:t>
+              <a:t>2/3/2022</a:t>
             </a:fld>
             <a:endParaRPr lang="en-US" dirty="0">
               <a:solidFill>
@@ -6767,7 +6767,7 @@
                   </a:prstClr>
                 </a:solidFill>
               </a:rPr>
-              <a:t>10/7/2021</a:t>
+              <a:t>2/3/2022</a:t>
             </a:fld>
             <a:endParaRPr lang="en-US" dirty="0">
               <a:solidFill>
@@ -7168,7 +7168,7 @@
                   </a:prstClr>
                 </a:solidFill>
               </a:rPr>
-              <a:t>10/7/2021</a:t>
+              <a:t>2/3/2022</a:t>
             </a:fld>
             <a:endParaRPr lang="en-US" dirty="0">
               <a:solidFill>
@@ -7318,7 +7318,7 @@
                   </a:prstClr>
                 </a:solidFill>
               </a:rPr>
-              <a:t>10/7/2021</a:t>
+              <a:t>2/3/2022</a:t>
             </a:fld>
             <a:endParaRPr lang="en-US" dirty="0">
               <a:solidFill>
@@ -7440,7 +7440,7 @@
                   </a:prstClr>
                 </a:solidFill>
               </a:rPr>
-              <a:t>10/7/2021</a:t>
+              <a:t>2/3/2022</a:t>
             </a:fld>
             <a:endParaRPr lang="en-US" dirty="0">
               <a:solidFill>
@@ -7722,7 +7722,7 @@
                   </a:prstClr>
                 </a:solidFill>
               </a:rPr>
-              <a:t>10/7/2021</a:t>
+              <a:t>2/3/2022</a:t>
             </a:fld>
             <a:endParaRPr lang="en-US" dirty="0">
               <a:solidFill>
@@ -8069,7 +8069,7 @@
                   </a:prstClr>
                 </a:solidFill>
               </a:rPr>
-              <a:t>10/7/2021</a:t>
+              <a:t>2/3/2022</a:t>
             </a:fld>
             <a:endParaRPr lang="en-US" dirty="0">
               <a:solidFill>
@@ -8783,7 +8783,7 @@
                   </a:prstClr>
                 </a:solidFill>
               </a:rPr>
-              <a:t>10/7/2021</a:t>
+              <a:t>2/3/2022</a:t>
             </a:fld>
             <a:endParaRPr lang="en-US" dirty="0">
               <a:solidFill>
@@ -9388,7 +9388,7 @@
           <a:p>
             <a:r>
               <a:rPr lang="it-IT" dirty="0"/>
-              <a:t>Yoox Academy </a:t>
+              <a:t>Academy </a:t>
             </a:r>
           </a:p>
         </p:txBody>
@@ -18403,27 +18403,13 @@
               <a:buNone/>
             </a:pPr>
             <a:r>
-              <a:rPr lang="it-IT" sz="1600" dirty="0">
+              <a:rPr lang="it-IT" sz="1600">
                 <a:solidFill>
                   <a:schemeClr val="bg1"/>
                 </a:solidFill>
                 <a:latin typeface="Consolas" panose="020B0609020204030204" pitchFamily="49" charset="0"/>
               </a:rPr>
               <a:t>	{</a:t>
-            </a:r>
-          </a:p>
-          <a:p>
-            <a:pPr marL="0" indent="0">
-              <a:buNone/>
-            </a:pPr>
-            <a:r>
-              <a:rPr lang="it-IT" sz="1600" dirty="0">
-                <a:solidFill>
-                  <a:schemeClr val="bg1"/>
-                </a:solidFill>
-                <a:latin typeface="Consolas" panose="020B0609020204030204" pitchFamily="49" charset="0"/>
-              </a:rPr>
-              <a:t>		_icecream = icecream;</a:t>
             </a:r>
           </a:p>
           <a:p>
@@ -23304,7 +23290,7 @@
         </p:spPr>
         <p:txBody>
           <a:bodyPr vert="horz" lIns="91440" tIns="45720" rIns="91440" bIns="45720" rtlCol="0">
-            <a:normAutofit fontScale="85000" lnSpcReduction="20000"/>
+            <a:normAutofit fontScale="62500" lnSpcReduction="20000"/>
           </a:bodyPr>
           <a:lstStyle>
             <a:lvl1pPr marL="342900" indent="-342900" algn="l" defTabSz="457200" rtl="0" eaLnBrk="1" latinLnBrk="0" hangingPunct="1">
@@ -23534,129 +23520,205 @@
             </a:lvl9pPr>
           </a:lstStyle>
           <a:p>
-            <a:pPr>
-              <a:lnSpc>
-                <a:spcPct val="200000"/>
-              </a:lnSpc>
-            </a:pPr>
-            <a:r>
-              <a:rPr lang="it-IT" sz="1400" b="1" dirty="0"/>
-              <a:t>Esercizo proposto:</a:t>
-            </a:r>
-            <a:r>
-              <a:rPr lang="it-IT" sz="1400" dirty="0"/>
-              <a:t> ogni mattina una gazzella si sveglia e ....</a:t>
-            </a:r>
-          </a:p>
-          <a:p>
-            <a:pPr marL="457200" lvl="1" indent="0">
-              <a:lnSpc>
-                <a:spcPct val="200000"/>
-              </a:lnSpc>
+            <a:pPr marL="0" indent="0">
               <a:buNone/>
             </a:pPr>
             <a:r>
-              <a:rPr lang="it-IT" sz="1400" dirty="0"/>
-              <a:t>Simulare il processo del ciclo di vita della Savana! Il programma principale deve occuparsi di instanziare due </a:t>
-            </a:r>
-            <a:r>
-              <a:rPr lang="it-IT" sz="1400" b="1" i="1" dirty="0"/>
-              <a:t>IAnimal</a:t>
-            </a:r>
-            <a:r>
-              <a:rPr lang="it-IT" sz="1400" dirty="0"/>
-              <a:t> che possono essere di tipo </a:t>
-            </a:r>
-            <a:r>
-              <a:rPr lang="it-IT" sz="1400" b="1" dirty="0"/>
-              <a:t>Herbivor</a:t>
-            </a:r>
-            <a:r>
-              <a:rPr lang="it-IT" sz="1400" dirty="0"/>
-              <a:t> o </a:t>
-            </a:r>
-            <a:r>
-              <a:rPr lang="it-IT" sz="1400" b="1" dirty="0"/>
-              <a:t>Carnivor</a:t>
-            </a:r>
-            <a:r>
-              <a:rPr lang="it-IT" sz="1400" dirty="0"/>
-              <a:t>. Entrambi i tipi di animali implementano il metodo </a:t>
-            </a:r>
-            <a:r>
-              <a:rPr lang="it-IT" sz="1400" b="1" dirty="0"/>
-              <a:t>Eat. </a:t>
-            </a:r>
-          </a:p>
-          <a:p>
-            <a:pPr marL="457200" lvl="1" indent="0">
-              <a:lnSpc>
-                <a:spcPct val="200000"/>
-              </a:lnSpc>
+              <a:rPr lang="it-IT" sz="1900" b="1" dirty="0" err="1"/>
+              <a:t>Esercizo</a:t>
+            </a:r>
+            <a:r>
+              <a:rPr lang="it-IT" sz="1900" b="1" dirty="0"/>
+              <a:t> proposto: </a:t>
+            </a:r>
+            <a:r>
+              <a:rPr lang="it-IT" sz="1900" b="1" u="sng" dirty="0"/>
+              <a:t>l</a:t>
+            </a:r>
+            <a:r>
+              <a:rPr lang="it-IT" u="sng" dirty="0"/>
+              <a:t>a</a:t>
+            </a:r>
+            <a:r>
+              <a:rPr lang="it-IT" dirty="0"/>
+              <a:t> nota pizzeria </a:t>
+            </a:r>
+            <a:r>
+              <a:rPr lang="it-IT" dirty="0" err="1"/>
+              <a:t>Sdomino</a:t>
+            </a:r>
+            <a:r>
+              <a:rPr lang="it-IT" dirty="0"/>
+              <a:t> vuole automatizzare il processo di ordinazione pizze e chiede a voi di realizzare un software che gestisca gli ordini in arrivo. In particolare:</a:t>
+            </a:r>
+          </a:p>
+          <a:p>
+            <a:pPr marL="0" indent="0">
               <a:buNone/>
             </a:pPr>
             <a:r>
-              <a:rPr lang="it-IT" sz="1400" dirty="0"/>
-              <a:t>Attenzione:</a:t>
-            </a:r>
-          </a:p>
-          <a:p>
-            <a:pPr lvl="2">
-              <a:lnSpc>
-                <a:spcPct val="200000"/>
-              </a:lnSpc>
-            </a:pPr>
-            <a:r>
-              <a:rPr lang="it-IT" b="1" dirty="0"/>
-              <a:t>Gli erbivori mangiano erba</a:t>
-            </a:r>
-          </a:p>
-          <a:p>
-            <a:pPr lvl="2">
-              <a:lnSpc>
-                <a:spcPct val="200000"/>
-              </a:lnSpc>
-            </a:pPr>
-            <a:r>
-              <a:rPr lang="it-IT" b="1" dirty="0"/>
-              <a:t>I carnivori mangiano ... erbivori!</a:t>
-            </a:r>
-          </a:p>
-          <a:p>
-            <a:pPr marL="514350" lvl="1" indent="0">
-              <a:lnSpc>
-                <a:spcPct val="200000"/>
-              </a:lnSpc>
+              <a:rPr lang="it-IT" dirty="0"/>
+              <a:t>- Le ordinazioni arrivano tramite file CSV, ogni riga contiene una pizza ordinata, nel seguente formato:</a:t>
+            </a:r>
+          </a:p>
+          <a:p>
+            <a:pPr marL="0" indent="0">
               <a:buNone/>
             </a:pPr>
             <a:r>
-              <a:rPr lang="it-IT" sz="1400" b="1" dirty="0"/>
-              <a:t>Quando un animale viene creto o mangia il programma deve loggare sia su Console sia su un altro output (DB, file, ...).</a:t>
-            </a:r>
-          </a:p>
-          <a:p>
-            <a:pPr marL="514350" lvl="1" indent="0">
-              <a:lnSpc>
-                <a:spcPct val="200000"/>
-              </a:lnSpc>
+              <a:rPr lang="it-IT" dirty="0"/>
+              <a:t>  </a:t>
+            </a:r>
+            <a:r>
+              <a:rPr lang="it-IT" dirty="0" err="1"/>
+              <a:t>BasePizza;Impasto;Aggiunte</a:t>
+            </a:r>
+            <a:endParaRPr lang="it-IT" dirty="0"/>
+          </a:p>
+          <a:p>
+            <a:pPr marL="0" indent="0">
               <a:buNone/>
             </a:pPr>
             <a:r>
-              <a:rPr lang="it-IT" sz="1400" b="1" dirty="0"/>
-              <a:t>Ricordate: </a:t>
-            </a:r>
-            <a:r>
-              <a:rPr lang="it-IT" sz="1400" u="sng" dirty="0"/>
-              <a:t>lo scopo dell’esercizio è utilizzare al meglio i design pattern!!</a:t>
-            </a:r>
-          </a:p>
-          <a:p>
-            <a:pPr marL="914400" lvl="2" indent="0">
-              <a:lnSpc>
-                <a:spcPct val="200000"/>
-              </a:lnSpc>
+              <a:rPr lang="it-IT" b="1" dirty="0"/>
+              <a:t>Esempio: </a:t>
+            </a:r>
+            <a:r>
+              <a:rPr lang="it-IT" dirty="0"/>
+              <a:t>«</a:t>
+            </a:r>
+            <a:r>
+              <a:rPr lang="it-IT" dirty="0" err="1"/>
+              <a:t>Margherita;Integrale;Prosciutto</a:t>
+            </a:r>
+            <a:r>
+              <a:rPr lang="it-IT" dirty="0"/>
+              <a:t> </a:t>
+            </a:r>
+            <a:r>
+              <a:rPr lang="it-IT" dirty="0" err="1"/>
+              <a:t>Cotto,Funghi</a:t>
+            </a:r>
+            <a:r>
+              <a:rPr lang="it-IT" dirty="0"/>
+              <a:t>»</a:t>
+            </a:r>
+          </a:p>
+          <a:p>
+            <a:pPr marL="0" indent="0">
               <a:buNone/>
             </a:pPr>
+            <a:r>
+              <a:rPr lang="it-IT" dirty="0"/>
+              <a:t>Dove:</a:t>
+            </a:r>
+          </a:p>
+          <a:p>
+            <a:pPr marL="0" indent="0">
+              <a:buNone/>
+            </a:pPr>
+            <a:r>
+              <a:rPr lang="it-IT" dirty="0"/>
+              <a:t>Base pizza può avere i seguenti valori: </a:t>
+            </a:r>
+            <a:r>
+              <a:rPr lang="it-IT" i="1" dirty="0"/>
+              <a:t>Margherita (5€)</a:t>
+            </a:r>
+            <a:r>
+              <a:rPr lang="it-IT" dirty="0"/>
+              <a:t>, </a:t>
+            </a:r>
+            <a:r>
+              <a:rPr lang="it-IT" i="1" dirty="0" err="1"/>
+              <a:t>Pepperoni</a:t>
+            </a:r>
+            <a:r>
+              <a:rPr lang="it-IT" i="1" dirty="0"/>
+              <a:t>(7€)</a:t>
+            </a:r>
+            <a:r>
+              <a:rPr lang="it-IT" dirty="0"/>
+              <a:t>, </a:t>
+            </a:r>
+            <a:r>
+              <a:rPr lang="it-IT" i="1" dirty="0"/>
+              <a:t>Napoletana(3€)</a:t>
+            </a:r>
+            <a:endParaRPr lang="it-IT" dirty="0"/>
+          </a:p>
+          <a:p>
+            <a:pPr marL="0" indent="0">
+              <a:buNone/>
+            </a:pPr>
+            <a:r>
+              <a:rPr lang="it-IT" dirty="0"/>
+              <a:t>Impasto: normale (0€), integrale (+1€)</a:t>
+            </a:r>
+          </a:p>
+          <a:p>
+            <a:pPr marL="0" indent="0">
+              <a:buNone/>
+            </a:pPr>
+            <a:r>
+              <a:rPr lang="it-IT" dirty="0"/>
+              <a:t>Le aggiunte possono essere più di una, </a:t>
+            </a:r>
+            <a:r>
+              <a:rPr lang="it-IT" dirty="0" err="1"/>
+              <a:t>separatio</a:t>
+            </a:r>
+            <a:r>
+              <a:rPr lang="it-IT" dirty="0"/>
+              <a:t> da «,» e sono: Prosciutto cotto (+1€), Funghi (+2€), Crudo (2€), Ananas (!!)</a:t>
+            </a:r>
+          </a:p>
+          <a:p>
+            <a:pPr marL="0" indent="0">
+              <a:buNone/>
+            </a:pPr>
+            <a:r>
+              <a:rPr lang="it-IT" dirty="0"/>
+              <a:t>Lo scopo del software è:</a:t>
+            </a:r>
+          </a:p>
+          <a:p>
+            <a:pPr marL="0" indent="0">
+              <a:buNone/>
+            </a:pPr>
+            <a:r>
+              <a:rPr lang="it-IT" dirty="0"/>
+              <a:t>-All’avvio leggere tutti gli ordini presenti e per ognuno di essi creare uno scontrino (ogni scontrino deve avere un identificativo progressivo) con il prezzo totale dell’ordine.</a:t>
+            </a:r>
+            <a:br>
+              <a:rPr lang="it-IT" dirty="0"/>
+            </a:br>
+            <a:r>
+              <a:rPr lang="it-IT" dirty="0"/>
+              <a:t>Attenzione: se una pizza contiene l’aggiunta Ananas allora la pizza è GRATIS!</a:t>
+            </a:r>
+          </a:p>
+          <a:p>
+            <a:pPr marL="0" indent="0">
+              <a:buNone/>
+            </a:pPr>
+            <a:r>
+              <a:rPr lang="it-IT" dirty="0"/>
+              <a:t>-Loggare lo scontrino su file e inserirlo a DB, in modo che gli ordini siano consultabili</a:t>
+            </a:r>
+          </a:p>
+          <a:p>
+            <a:pPr marL="0" indent="0">
+              <a:buNone/>
+            </a:pPr>
+            <a:r>
+              <a:rPr lang="it-IT" b="1" dirty="0"/>
+              <a:t>Obbligo: </a:t>
+            </a:r>
+            <a:r>
+              <a:rPr lang="it-IT" u="sng" dirty="0"/>
+              <a:t>lo scopo dell’esercizio è utilizzare al meglio i design pattern!!</a:t>
+            </a:r>
             <a:endParaRPr lang="it-IT" b="1" dirty="0"/>
           </a:p>
         </p:txBody>
@@ -24559,6 +24621,521 @@
                                           <p:spTgt spid="5">
                                             <p:txEl>
                                               <p:pRg st="6" end="6"/>
+                                            </p:txEl>
+                                          </p:spTgt>
+                                        </p:tgtEl>
+                                        <p:attrNameLst>
+                                          <p:attrName>ppt_y</p:attrName>
+                                        </p:attrNameLst>
+                                      </p:cBhvr>
+                                      <p:tavLst>
+                                        <p:tav tm="0">
+                                          <p:val>
+                                            <p:strVal val="1+#ppt_h/2"/>
+                                          </p:val>
+                                        </p:tav>
+                                        <p:tav tm="100000">
+                                          <p:val>
+                                            <p:strVal val="#ppt_y"/>
+                                          </p:val>
+                                        </p:tav>
+                                      </p:tavLst>
+                                    </p:anim>
+                                  </p:childTnLst>
+                                </p:cTn>
+                              </p:par>
+                            </p:childTnLst>
+                          </p:cTn>
+                        </p:par>
+                      </p:childTnLst>
+                    </p:cTn>
+                  </p:par>
+                  <p:par>
+                    <p:cTn id="51" fill="hold">
+                      <p:stCondLst>
+                        <p:cond delay="indefinite"/>
+                      </p:stCondLst>
+                      <p:childTnLst>
+                        <p:par>
+                          <p:cTn id="52" fill="hold">
+                            <p:stCondLst>
+                              <p:cond delay="0"/>
+                            </p:stCondLst>
+                            <p:childTnLst>
+                              <p:par>
+                                <p:cTn id="53" presetID="2" presetClass="entr" presetSubtype="4" fill="hold" nodeType="clickEffect">
+                                  <p:stCondLst>
+                                    <p:cond delay="0"/>
+                                  </p:stCondLst>
+                                  <p:childTnLst>
+                                    <p:set>
+                                      <p:cBhvr>
+                                        <p:cTn id="54" dur="1" fill="hold">
+                                          <p:stCondLst>
+                                            <p:cond delay="0"/>
+                                          </p:stCondLst>
+                                        </p:cTn>
+                                        <p:tgtEl>
+                                          <p:spTgt spid="5">
+                                            <p:txEl>
+                                              <p:pRg st="7" end="7"/>
+                                            </p:txEl>
+                                          </p:spTgt>
+                                        </p:tgtEl>
+                                        <p:attrNameLst>
+                                          <p:attrName>style.visibility</p:attrName>
+                                        </p:attrNameLst>
+                                      </p:cBhvr>
+                                      <p:to>
+                                        <p:strVal val="visible"/>
+                                      </p:to>
+                                    </p:set>
+                                    <p:anim calcmode="lin" valueType="num">
+                                      <p:cBhvr additive="base">
+                                        <p:cTn id="55" dur="500" fill="hold"/>
+                                        <p:tgtEl>
+                                          <p:spTgt spid="5">
+                                            <p:txEl>
+                                              <p:pRg st="7" end="7"/>
+                                            </p:txEl>
+                                          </p:spTgt>
+                                        </p:tgtEl>
+                                        <p:attrNameLst>
+                                          <p:attrName>ppt_x</p:attrName>
+                                        </p:attrNameLst>
+                                      </p:cBhvr>
+                                      <p:tavLst>
+                                        <p:tav tm="0">
+                                          <p:val>
+                                            <p:strVal val="#ppt_x"/>
+                                          </p:val>
+                                        </p:tav>
+                                        <p:tav tm="100000">
+                                          <p:val>
+                                            <p:strVal val="#ppt_x"/>
+                                          </p:val>
+                                        </p:tav>
+                                      </p:tavLst>
+                                    </p:anim>
+                                    <p:anim calcmode="lin" valueType="num">
+                                      <p:cBhvr additive="base">
+                                        <p:cTn id="56" dur="500" fill="hold"/>
+                                        <p:tgtEl>
+                                          <p:spTgt spid="5">
+                                            <p:txEl>
+                                              <p:pRg st="7" end="7"/>
+                                            </p:txEl>
+                                          </p:spTgt>
+                                        </p:tgtEl>
+                                        <p:attrNameLst>
+                                          <p:attrName>ppt_y</p:attrName>
+                                        </p:attrNameLst>
+                                      </p:cBhvr>
+                                      <p:tavLst>
+                                        <p:tav tm="0">
+                                          <p:val>
+                                            <p:strVal val="1+#ppt_h/2"/>
+                                          </p:val>
+                                        </p:tav>
+                                        <p:tav tm="100000">
+                                          <p:val>
+                                            <p:strVal val="#ppt_y"/>
+                                          </p:val>
+                                        </p:tav>
+                                      </p:tavLst>
+                                    </p:anim>
+                                  </p:childTnLst>
+                                </p:cTn>
+                              </p:par>
+                            </p:childTnLst>
+                          </p:cTn>
+                        </p:par>
+                      </p:childTnLst>
+                    </p:cTn>
+                  </p:par>
+                  <p:par>
+                    <p:cTn id="57" fill="hold">
+                      <p:stCondLst>
+                        <p:cond delay="indefinite"/>
+                      </p:stCondLst>
+                      <p:childTnLst>
+                        <p:par>
+                          <p:cTn id="58" fill="hold">
+                            <p:stCondLst>
+                              <p:cond delay="0"/>
+                            </p:stCondLst>
+                            <p:childTnLst>
+                              <p:par>
+                                <p:cTn id="59" presetID="2" presetClass="entr" presetSubtype="4" fill="hold" nodeType="clickEffect">
+                                  <p:stCondLst>
+                                    <p:cond delay="0"/>
+                                  </p:stCondLst>
+                                  <p:childTnLst>
+                                    <p:set>
+                                      <p:cBhvr>
+                                        <p:cTn id="60" dur="1" fill="hold">
+                                          <p:stCondLst>
+                                            <p:cond delay="0"/>
+                                          </p:stCondLst>
+                                        </p:cTn>
+                                        <p:tgtEl>
+                                          <p:spTgt spid="5">
+                                            <p:txEl>
+                                              <p:pRg st="8" end="8"/>
+                                            </p:txEl>
+                                          </p:spTgt>
+                                        </p:tgtEl>
+                                        <p:attrNameLst>
+                                          <p:attrName>style.visibility</p:attrName>
+                                        </p:attrNameLst>
+                                      </p:cBhvr>
+                                      <p:to>
+                                        <p:strVal val="visible"/>
+                                      </p:to>
+                                    </p:set>
+                                    <p:anim calcmode="lin" valueType="num">
+                                      <p:cBhvr additive="base">
+                                        <p:cTn id="61" dur="500" fill="hold"/>
+                                        <p:tgtEl>
+                                          <p:spTgt spid="5">
+                                            <p:txEl>
+                                              <p:pRg st="8" end="8"/>
+                                            </p:txEl>
+                                          </p:spTgt>
+                                        </p:tgtEl>
+                                        <p:attrNameLst>
+                                          <p:attrName>ppt_x</p:attrName>
+                                        </p:attrNameLst>
+                                      </p:cBhvr>
+                                      <p:tavLst>
+                                        <p:tav tm="0">
+                                          <p:val>
+                                            <p:strVal val="#ppt_x"/>
+                                          </p:val>
+                                        </p:tav>
+                                        <p:tav tm="100000">
+                                          <p:val>
+                                            <p:strVal val="#ppt_x"/>
+                                          </p:val>
+                                        </p:tav>
+                                      </p:tavLst>
+                                    </p:anim>
+                                    <p:anim calcmode="lin" valueType="num">
+                                      <p:cBhvr additive="base">
+                                        <p:cTn id="62" dur="500" fill="hold"/>
+                                        <p:tgtEl>
+                                          <p:spTgt spid="5">
+                                            <p:txEl>
+                                              <p:pRg st="8" end="8"/>
+                                            </p:txEl>
+                                          </p:spTgt>
+                                        </p:tgtEl>
+                                        <p:attrNameLst>
+                                          <p:attrName>ppt_y</p:attrName>
+                                        </p:attrNameLst>
+                                      </p:cBhvr>
+                                      <p:tavLst>
+                                        <p:tav tm="0">
+                                          <p:val>
+                                            <p:strVal val="1+#ppt_h/2"/>
+                                          </p:val>
+                                        </p:tav>
+                                        <p:tav tm="100000">
+                                          <p:val>
+                                            <p:strVal val="#ppt_y"/>
+                                          </p:val>
+                                        </p:tav>
+                                      </p:tavLst>
+                                    </p:anim>
+                                  </p:childTnLst>
+                                </p:cTn>
+                              </p:par>
+                            </p:childTnLst>
+                          </p:cTn>
+                        </p:par>
+                      </p:childTnLst>
+                    </p:cTn>
+                  </p:par>
+                  <p:par>
+                    <p:cTn id="63" fill="hold">
+                      <p:stCondLst>
+                        <p:cond delay="indefinite"/>
+                      </p:stCondLst>
+                      <p:childTnLst>
+                        <p:par>
+                          <p:cTn id="64" fill="hold">
+                            <p:stCondLst>
+                              <p:cond delay="0"/>
+                            </p:stCondLst>
+                            <p:childTnLst>
+                              <p:par>
+                                <p:cTn id="65" presetID="2" presetClass="entr" presetSubtype="4" fill="hold" nodeType="clickEffect">
+                                  <p:stCondLst>
+                                    <p:cond delay="0"/>
+                                  </p:stCondLst>
+                                  <p:childTnLst>
+                                    <p:set>
+                                      <p:cBhvr>
+                                        <p:cTn id="66" dur="1" fill="hold">
+                                          <p:stCondLst>
+                                            <p:cond delay="0"/>
+                                          </p:stCondLst>
+                                        </p:cTn>
+                                        <p:tgtEl>
+                                          <p:spTgt spid="5">
+                                            <p:txEl>
+                                              <p:pRg st="9" end="9"/>
+                                            </p:txEl>
+                                          </p:spTgt>
+                                        </p:tgtEl>
+                                        <p:attrNameLst>
+                                          <p:attrName>style.visibility</p:attrName>
+                                        </p:attrNameLst>
+                                      </p:cBhvr>
+                                      <p:to>
+                                        <p:strVal val="visible"/>
+                                      </p:to>
+                                    </p:set>
+                                    <p:anim calcmode="lin" valueType="num">
+                                      <p:cBhvr additive="base">
+                                        <p:cTn id="67" dur="500" fill="hold"/>
+                                        <p:tgtEl>
+                                          <p:spTgt spid="5">
+                                            <p:txEl>
+                                              <p:pRg st="9" end="9"/>
+                                            </p:txEl>
+                                          </p:spTgt>
+                                        </p:tgtEl>
+                                        <p:attrNameLst>
+                                          <p:attrName>ppt_x</p:attrName>
+                                        </p:attrNameLst>
+                                      </p:cBhvr>
+                                      <p:tavLst>
+                                        <p:tav tm="0">
+                                          <p:val>
+                                            <p:strVal val="#ppt_x"/>
+                                          </p:val>
+                                        </p:tav>
+                                        <p:tav tm="100000">
+                                          <p:val>
+                                            <p:strVal val="#ppt_x"/>
+                                          </p:val>
+                                        </p:tav>
+                                      </p:tavLst>
+                                    </p:anim>
+                                    <p:anim calcmode="lin" valueType="num">
+                                      <p:cBhvr additive="base">
+                                        <p:cTn id="68" dur="500" fill="hold"/>
+                                        <p:tgtEl>
+                                          <p:spTgt spid="5">
+                                            <p:txEl>
+                                              <p:pRg st="9" end="9"/>
+                                            </p:txEl>
+                                          </p:spTgt>
+                                        </p:tgtEl>
+                                        <p:attrNameLst>
+                                          <p:attrName>ppt_y</p:attrName>
+                                        </p:attrNameLst>
+                                      </p:cBhvr>
+                                      <p:tavLst>
+                                        <p:tav tm="0">
+                                          <p:val>
+                                            <p:strVal val="1+#ppt_h/2"/>
+                                          </p:val>
+                                        </p:tav>
+                                        <p:tav tm="100000">
+                                          <p:val>
+                                            <p:strVal val="#ppt_y"/>
+                                          </p:val>
+                                        </p:tav>
+                                      </p:tavLst>
+                                    </p:anim>
+                                  </p:childTnLst>
+                                </p:cTn>
+                              </p:par>
+                            </p:childTnLst>
+                          </p:cTn>
+                        </p:par>
+                      </p:childTnLst>
+                    </p:cTn>
+                  </p:par>
+                  <p:par>
+                    <p:cTn id="69" fill="hold">
+                      <p:stCondLst>
+                        <p:cond delay="indefinite"/>
+                      </p:stCondLst>
+                      <p:childTnLst>
+                        <p:par>
+                          <p:cTn id="70" fill="hold">
+                            <p:stCondLst>
+                              <p:cond delay="0"/>
+                            </p:stCondLst>
+                            <p:childTnLst>
+                              <p:par>
+                                <p:cTn id="71" presetID="2" presetClass="entr" presetSubtype="4" fill="hold" nodeType="clickEffect">
+                                  <p:stCondLst>
+                                    <p:cond delay="0"/>
+                                  </p:stCondLst>
+                                  <p:childTnLst>
+                                    <p:set>
+                                      <p:cBhvr>
+                                        <p:cTn id="72" dur="1" fill="hold">
+                                          <p:stCondLst>
+                                            <p:cond delay="0"/>
+                                          </p:stCondLst>
+                                        </p:cTn>
+                                        <p:tgtEl>
+                                          <p:spTgt spid="5">
+                                            <p:txEl>
+                                              <p:pRg st="10" end="10"/>
+                                            </p:txEl>
+                                          </p:spTgt>
+                                        </p:tgtEl>
+                                        <p:attrNameLst>
+                                          <p:attrName>style.visibility</p:attrName>
+                                        </p:attrNameLst>
+                                      </p:cBhvr>
+                                      <p:to>
+                                        <p:strVal val="visible"/>
+                                      </p:to>
+                                    </p:set>
+                                    <p:anim calcmode="lin" valueType="num">
+                                      <p:cBhvr additive="base">
+                                        <p:cTn id="73" dur="500" fill="hold"/>
+                                        <p:tgtEl>
+                                          <p:spTgt spid="5">
+                                            <p:txEl>
+                                              <p:pRg st="10" end="10"/>
+                                            </p:txEl>
+                                          </p:spTgt>
+                                        </p:tgtEl>
+                                        <p:attrNameLst>
+                                          <p:attrName>ppt_x</p:attrName>
+                                        </p:attrNameLst>
+                                      </p:cBhvr>
+                                      <p:tavLst>
+                                        <p:tav tm="0">
+                                          <p:val>
+                                            <p:strVal val="#ppt_x"/>
+                                          </p:val>
+                                        </p:tav>
+                                        <p:tav tm="100000">
+                                          <p:val>
+                                            <p:strVal val="#ppt_x"/>
+                                          </p:val>
+                                        </p:tav>
+                                      </p:tavLst>
+                                    </p:anim>
+                                    <p:anim calcmode="lin" valueType="num">
+                                      <p:cBhvr additive="base">
+                                        <p:cTn id="74" dur="500" fill="hold"/>
+                                        <p:tgtEl>
+                                          <p:spTgt spid="5">
+                                            <p:txEl>
+                                              <p:pRg st="10" end="10"/>
+                                            </p:txEl>
+                                          </p:spTgt>
+                                        </p:tgtEl>
+                                        <p:attrNameLst>
+                                          <p:attrName>ppt_y</p:attrName>
+                                        </p:attrNameLst>
+                                      </p:cBhvr>
+                                      <p:tavLst>
+                                        <p:tav tm="0">
+                                          <p:val>
+                                            <p:strVal val="1+#ppt_h/2"/>
+                                          </p:val>
+                                        </p:tav>
+                                        <p:tav tm="100000">
+                                          <p:val>
+                                            <p:strVal val="#ppt_y"/>
+                                          </p:val>
+                                        </p:tav>
+                                      </p:tavLst>
+                                    </p:anim>
+                                  </p:childTnLst>
+                                </p:cTn>
+                              </p:par>
+                            </p:childTnLst>
+                          </p:cTn>
+                        </p:par>
+                      </p:childTnLst>
+                    </p:cTn>
+                  </p:par>
+                  <p:par>
+                    <p:cTn id="75" fill="hold">
+                      <p:stCondLst>
+                        <p:cond delay="indefinite"/>
+                      </p:stCondLst>
+                      <p:childTnLst>
+                        <p:par>
+                          <p:cTn id="76" fill="hold">
+                            <p:stCondLst>
+                              <p:cond delay="0"/>
+                            </p:stCondLst>
+                            <p:childTnLst>
+                              <p:par>
+                                <p:cTn id="77" presetID="2" presetClass="entr" presetSubtype="4" fill="hold" nodeType="clickEffect">
+                                  <p:stCondLst>
+                                    <p:cond delay="0"/>
+                                  </p:stCondLst>
+                                  <p:childTnLst>
+                                    <p:set>
+                                      <p:cBhvr>
+                                        <p:cTn id="78" dur="1" fill="hold">
+                                          <p:stCondLst>
+                                            <p:cond delay="0"/>
+                                          </p:stCondLst>
+                                        </p:cTn>
+                                        <p:tgtEl>
+                                          <p:spTgt spid="5">
+                                            <p:txEl>
+                                              <p:pRg st="11" end="11"/>
+                                            </p:txEl>
+                                          </p:spTgt>
+                                        </p:tgtEl>
+                                        <p:attrNameLst>
+                                          <p:attrName>style.visibility</p:attrName>
+                                        </p:attrNameLst>
+                                      </p:cBhvr>
+                                      <p:to>
+                                        <p:strVal val="visible"/>
+                                      </p:to>
+                                    </p:set>
+                                    <p:anim calcmode="lin" valueType="num">
+                                      <p:cBhvr additive="base">
+                                        <p:cTn id="79" dur="500" fill="hold"/>
+                                        <p:tgtEl>
+                                          <p:spTgt spid="5">
+                                            <p:txEl>
+                                              <p:pRg st="11" end="11"/>
+                                            </p:txEl>
+                                          </p:spTgt>
+                                        </p:tgtEl>
+                                        <p:attrNameLst>
+                                          <p:attrName>ppt_x</p:attrName>
+                                        </p:attrNameLst>
+                                      </p:cBhvr>
+                                      <p:tavLst>
+                                        <p:tav tm="0">
+                                          <p:val>
+                                            <p:strVal val="#ppt_x"/>
+                                          </p:val>
+                                        </p:tav>
+                                        <p:tav tm="100000">
+                                          <p:val>
+                                            <p:strVal val="#ppt_x"/>
+                                          </p:val>
+                                        </p:tav>
+                                      </p:tavLst>
+                                    </p:anim>
+                                    <p:anim calcmode="lin" valueType="num">
+                                      <p:cBhvr additive="base">
+                                        <p:cTn id="80" dur="500" fill="hold"/>
+                                        <p:tgtEl>
+                                          <p:spTgt spid="5">
+                                            <p:txEl>
+                                              <p:pRg st="11" end="11"/>
                                             </p:txEl>
                                           </p:spTgt>
                                         </p:tgtEl>
@@ -29711,10 +30288,6 @@
             <a:br>
               <a:rPr lang="it-IT" sz="5400" dirty="0"/>
             </a:br>
-            <a:r>
-              <a:rPr lang="it-IT" dirty="0"/>
-              <a:t>#selfietime</a:t>
-            </a:r>
             <a:endParaRPr lang="it-IT" sz="5400" dirty="0"/>
           </a:p>
         </p:txBody>

</xml_diff>